<commit_message>
Deep analysis added; conclusions generalized to 3 metals but not done yet
</commit_message>
<xml_diff>
--- a/correlation-to-add.pptx
+++ b/correlation-to-add.pptx
@@ -6,6 +6,7 @@
   </p:sldMasterIdLst>
   <p:sldIdLst>
     <p:sldId id="256" r:id="rId2"/>
+    <p:sldId id="257" r:id="rId3"/>
   </p:sldIdLst>
   <p:sldSz cx="12192000" cy="6858000"/>
   <p:notesSz cx="6858000" cy="9144000"/>
@@ -239,7 +240,6 @@
           </c:extLst>
         </c:ser>
         <c:dLbls>
-          <c:dLblPos val="t"/>
           <c:showLegendKey val="0"/>
           <c:showVal val="0"/>
           <c:showCatName val="0"/>
@@ -528,7 +528,731 @@
 </c:chartSpace>
 </file>
 
+<file path=ppt/charts/chart2.xml><?xml version="1.0" encoding="utf-8"?>
+<c:chartSpace xmlns:c="http://schemas.openxmlformats.org/drawingml/2006/chart" xmlns:a="http://schemas.openxmlformats.org/drawingml/2006/main" xmlns:r="http://schemas.openxmlformats.org/officeDocument/2006/relationships" xmlns:c16r2="http://schemas.microsoft.com/office/drawing/2015/06/chart">
+  <c:date1904 val="0"/>
+  <c:lang val="en-US"/>
+  <c:roundedCorners val="0"/>
+  <mc:AlternateContent xmlns:mc="http://schemas.openxmlformats.org/markup-compatibility/2006">
+    <mc:Choice xmlns:c14="http://schemas.microsoft.com/office/drawing/2007/8/2/chart" Requires="c14">
+      <c14:style val="102"/>
+    </mc:Choice>
+    <mc:Fallback>
+      <c:style val="2"/>
+    </mc:Fallback>
+  </mc:AlternateContent>
+  <c:chart>
+    <c:autoTitleDeleted val="1"/>
+    <c:plotArea>
+      <c:layout/>
+      <c:scatterChart>
+        <c:scatterStyle val="lineMarker"/>
+        <c:varyColors val="0"/>
+        <c:ser>
+          <c:idx val="0"/>
+          <c:order val="0"/>
+          <c:spPr>
+            <a:ln w="25400" cap="rnd">
+              <a:noFill/>
+              <a:round/>
+            </a:ln>
+            <a:effectLst/>
+          </c:spPr>
+          <c:marker>
+            <c:symbol val="circle"/>
+            <c:size val="10"/>
+            <c:spPr>
+              <a:solidFill>
+                <a:schemeClr val="accent5"/>
+              </a:solidFill>
+              <a:ln w="9525">
+                <a:solidFill>
+                  <a:schemeClr val="tx1"/>
+                </a:solidFill>
+              </a:ln>
+              <a:effectLst/>
+            </c:spPr>
+          </c:marker>
+          <c:dLbls>
+            <c:dLbl>
+              <c:idx val="0"/>
+              <c:tx>
+                <c:rich>
+                  <a:bodyPr/>
+                  <a:lstStyle/>
+                  <a:p>
+                    <a:fld id="{74655D7C-D892-4246-B9DF-01383776488E}" type="CELLRANGE">
+                      <a:rPr lang="en-US"/>
+                      <a:pPr/>
+                      <a:t>[CELLRANGE]</a:t>
+                    </a:fld>
+                    <a:endParaRPr lang="en-US"/>
+                  </a:p>
+                </c:rich>
+              </c:tx>
+              <c:dLblPos val="l"/>
+              <c:showLegendKey val="0"/>
+              <c:showVal val="0"/>
+              <c:showCatName val="0"/>
+              <c:showSerName val="0"/>
+              <c:showPercent val="0"/>
+              <c:showBubbleSize val="0"/>
+              <c:extLst>
+                <c:ext xmlns:c15="http://schemas.microsoft.com/office/drawing/2012/chart" uri="{CE6537A1-D6FC-4f65-9D91-7224C49458BB}">
+                  <c15:dlblFieldTable/>
+                  <c15:xForSave val="1"/>
+                  <c15:showDataLabelsRange val="1"/>
+                </c:ext>
+                <c:ext xmlns:c16="http://schemas.microsoft.com/office/drawing/2014/chart" uri="{C3380CC4-5D6E-409C-BE32-E72D297353CC}">
+                  <c16:uniqueId val="{00000000-7DA5-E446-857E-1A442F19ED87}"/>
+                </c:ext>
+              </c:extLst>
+            </c:dLbl>
+            <c:dLbl>
+              <c:idx val="1"/>
+              <c:tx>
+                <c:rich>
+                  <a:bodyPr/>
+                  <a:lstStyle/>
+                  <a:p>
+                    <a:fld id="{9E3CD877-2019-564F-842C-057C751A7973}" type="CELLRANGE">
+                      <a:rPr lang="en-US"/>
+                      <a:pPr/>
+                      <a:t>[CELLRANGE]</a:t>
+                    </a:fld>
+                    <a:endParaRPr lang="en-US"/>
+                  </a:p>
+                </c:rich>
+              </c:tx>
+              <c:dLblPos val="l"/>
+              <c:showLegendKey val="0"/>
+              <c:showVal val="0"/>
+              <c:showCatName val="0"/>
+              <c:showSerName val="0"/>
+              <c:showPercent val="0"/>
+              <c:showBubbleSize val="0"/>
+              <c:extLst>
+                <c:ext xmlns:c15="http://schemas.microsoft.com/office/drawing/2012/chart" uri="{CE6537A1-D6FC-4f65-9D91-7224C49458BB}">
+                  <c15:dlblFieldTable/>
+                  <c15:xForSave val="1"/>
+                  <c15:showDataLabelsRange val="1"/>
+                </c:ext>
+                <c:ext xmlns:c16="http://schemas.microsoft.com/office/drawing/2014/chart" uri="{C3380CC4-5D6E-409C-BE32-E72D297353CC}">
+                  <c16:uniqueId val="{00000001-7DA5-E446-857E-1A442F19ED87}"/>
+                </c:ext>
+              </c:extLst>
+            </c:dLbl>
+            <c:dLbl>
+              <c:idx val="2"/>
+              <c:tx>
+                <c:rich>
+                  <a:bodyPr/>
+                  <a:lstStyle/>
+                  <a:p>
+                    <a:fld id="{51C46E90-1BAC-4742-9726-B0FC2A4AC1F8}" type="CELLRANGE">
+                      <a:rPr lang="en-US"/>
+                      <a:pPr/>
+                      <a:t>[CELLRANGE]</a:t>
+                    </a:fld>
+                    <a:endParaRPr lang="en-US"/>
+                  </a:p>
+                </c:rich>
+              </c:tx>
+              <c:dLblPos val="l"/>
+              <c:showLegendKey val="0"/>
+              <c:showVal val="0"/>
+              <c:showCatName val="0"/>
+              <c:showSerName val="0"/>
+              <c:showPercent val="0"/>
+              <c:showBubbleSize val="0"/>
+              <c:extLst>
+                <c:ext xmlns:c15="http://schemas.microsoft.com/office/drawing/2012/chart" uri="{CE6537A1-D6FC-4f65-9D91-7224C49458BB}">
+                  <c15:dlblFieldTable/>
+                  <c15:xForSave val="1"/>
+                  <c15:showDataLabelsRange val="1"/>
+                </c:ext>
+                <c:ext xmlns:c16="http://schemas.microsoft.com/office/drawing/2014/chart" uri="{C3380CC4-5D6E-409C-BE32-E72D297353CC}">
+                  <c16:uniqueId val="{00000002-7DA5-E446-857E-1A442F19ED87}"/>
+                </c:ext>
+              </c:extLst>
+            </c:dLbl>
+            <c:spPr>
+              <a:noFill/>
+              <a:ln>
+                <a:noFill/>
+              </a:ln>
+              <a:effectLst/>
+            </c:spPr>
+            <c:txPr>
+              <a:bodyPr rot="0" spcFirstLastPara="1" vertOverflow="ellipsis" vert="horz" wrap="square" lIns="38100" tIns="19050" rIns="38100" bIns="19050" anchor="ctr" anchorCtr="1">
+                <a:spAutoFit/>
+              </a:bodyPr>
+              <a:lstStyle/>
+              <a:p>
+                <a:pPr>
+                  <a:defRPr sz="1800" b="0" i="0" u="none" strike="noStrike" kern="1200" baseline="0">
+                    <a:solidFill>
+                      <a:schemeClr val="tx1">
+                        <a:lumMod val="75000"/>
+                        <a:lumOff val="25000"/>
+                      </a:schemeClr>
+                    </a:solidFill>
+                    <a:latin typeface="Arial" panose="020B0604020202020204" pitchFamily="34" charset="0"/>
+                    <a:ea typeface="+mn-ea"/>
+                    <a:cs typeface="Arial" panose="020B0604020202020204" pitchFamily="34" charset="0"/>
+                  </a:defRPr>
+                </a:pPr>
+                <a:endParaRPr lang="en-US"/>
+              </a:p>
+            </c:txPr>
+            <c:dLblPos val="l"/>
+            <c:showLegendKey val="0"/>
+            <c:showVal val="0"/>
+            <c:showCatName val="0"/>
+            <c:showSerName val="0"/>
+            <c:showPercent val="0"/>
+            <c:showBubbleSize val="0"/>
+            <c:showLeaderLines val="0"/>
+            <c:extLst>
+              <c:ext xmlns:c15="http://schemas.microsoft.com/office/drawing/2012/chart" uri="{CE6537A1-D6FC-4f65-9D91-7224C49458BB}">
+                <c15:showDataLabelsRange val="1"/>
+                <c15:showLeaderLines val="1"/>
+                <c15:leaderLines>
+                  <c:spPr>
+                    <a:ln w="9525" cap="flat" cmpd="sng" algn="ctr">
+                      <a:solidFill>
+                        <a:schemeClr val="tx1">
+                          <a:lumMod val="35000"/>
+                          <a:lumOff val="65000"/>
+                        </a:schemeClr>
+                      </a:solidFill>
+                      <a:round/>
+                    </a:ln>
+                    <a:effectLst/>
+                  </c:spPr>
+                </c15:leaderLines>
+              </c:ext>
+            </c:extLst>
+          </c:dLbls>
+          <c:xVal>
+            <c:numRef>
+              <c:f>Sheet1!$A$2:$A$4</c:f>
+              <c:numCache>
+                <c:formatCode>General</c:formatCode>
+                <c:ptCount val="3"/>
+                <c:pt idx="0">
+                  <c:v>0.4</c:v>
+                </c:pt>
+                <c:pt idx="1">
+                  <c:v>0.85</c:v>
+                </c:pt>
+                <c:pt idx="2">
+                  <c:v>1.35</c:v>
+                </c:pt>
+              </c:numCache>
+            </c:numRef>
+          </c:xVal>
+          <c:yVal>
+            <c:numRef>
+              <c:f>Sheet1!$B$2:$B$4</c:f>
+              <c:numCache>
+                <c:formatCode>General</c:formatCode>
+                <c:ptCount val="3"/>
+                <c:pt idx="0">
+                  <c:v>1.56</c:v>
+                </c:pt>
+                <c:pt idx="1">
+                  <c:v>1.56</c:v>
+                </c:pt>
+                <c:pt idx="2">
+                  <c:v>1.76</c:v>
+                </c:pt>
+              </c:numCache>
+            </c:numRef>
+          </c:yVal>
+          <c:smooth val="0"/>
+          <c:extLst>
+            <c:ext xmlns:c15="http://schemas.microsoft.com/office/drawing/2012/chart" uri="{02D57815-91ED-43cb-92C2-25804820EDAC}">
+              <c15:datalabelsRange>
+                <c15:f>Sheet1!$D$2:$D$4</c15:f>
+                <c15:dlblRangeCache>
+                  <c:ptCount val="3"/>
+                  <c:pt idx="0">
+                    <c:v>Au</c:v>
+                  </c:pt>
+                  <c:pt idx="1">
+                    <c:v>Ag</c:v>
+                  </c:pt>
+                  <c:pt idx="2">
+                    <c:v>Cu</c:v>
+                  </c:pt>
+                </c15:dlblRangeCache>
+              </c15:datalabelsRange>
+            </c:ext>
+            <c:ext xmlns:c16="http://schemas.microsoft.com/office/drawing/2014/chart" uri="{C3380CC4-5D6E-409C-BE32-E72D297353CC}">
+              <c16:uniqueId val="{00000003-7DA5-E446-857E-1A442F19ED87}"/>
+            </c:ext>
+          </c:extLst>
+        </c:ser>
+        <c:ser>
+          <c:idx val="1"/>
+          <c:order val="1"/>
+          <c:spPr>
+            <a:ln w="25400" cap="rnd">
+              <a:noFill/>
+              <a:round/>
+            </a:ln>
+            <a:effectLst/>
+          </c:spPr>
+          <c:marker>
+            <c:symbol val="circle"/>
+            <c:size val="10"/>
+            <c:spPr>
+              <a:solidFill>
+                <a:srgbClr val="FF0000"/>
+              </a:solidFill>
+              <a:ln w="9525">
+                <a:solidFill>
+                  <a:schemeClr val="tx1"/>
+                </a:solidFill>
+              </a:ln>
+              <a:effectLst/>
+            </c:spPr>
+          </c:marker>
+          <c:trendline>
+            <c:spPr>
+              <a:ln w="38100" cap="rnd">
+                <a:solidFill>
+                  <a:srgbClr val="FF0000"/>
+                </a:solidFill>
+                <a:prstDash val="sysDot"/>
+              </a:ln>
+              <a:effectLst/>
+            </c:spPr>
+            <c:trendlineType val="linear"/>
+            <c:backward val="0.4"/>
+            <c:dispRSqr val="0"/>
+            <c:dispEq val="0"/>
+          </c:trendline>
+          <c:xVal>
+            <c:numRef>
+              <c:f>Sheet1!$A$2:$A$4</c:f>
+              <c:numCache>
+                <c:formatCode>General</c:formatCode>
+                <c:ptCount val="3"/>
+                <c:pt idx="0">
+                  <c:v>0.4</c:v>
+                </c:pt>
+                <c:pt idx="1">
+                  <c:v>0.85</c:v>
+                </c:pt>
+                <c:pt idx="2">
+                  <c:v>1.35</c:v>
+                </c:pt>
+              </c:numCache>
+            </c:numRef>
+          </c:xVal>
+          <c:yVal>
+            <c:numRef>
+              <c:f>Sheet1!$C$2:$C$4</c:f>
+              <c:numCache>
+                <c:formatCode>General</c:formatCode>
+                <c:ptCount val="3"/>
+                <c:pt idx="0">
+                  <c:v>1.2000000000000002</c:v>
+                </c:pt>
+                <c:pt idx="1">
+                  <c:v>1.42</c:v>
+                </c:pt>
+                <c:pt idx="2">
+                  <c:v>1.6</c:v>
+                </c:pt>
+              </c:numCache>
+            </c:numRef>
+          </c:yVal>
+          <c:smooth val="0"/>
+          <c:extLst>
+            <c:ext xmlns:c16="http://schemas.microsoft.com/office/drawing/2014/chart" uri="{C3380CC4-5D6E-409C-BE32-E72D297353CC}">
+              <c16:uniqueId val="{00000005-7DA5-E446-857E-1A442F19ED87}"/>
+            </c:ext>
+          </c:extLst>
+        </c:ser>
+        <c:ser>
+          <c:idx val="2"/>
+          <c:order val="2"/>
+          <c:spPr>
+            <a:ln w="38100" cap="rnd">
+              <a:solidFill>
+                <a:srgbClr val="00B050"/>
+              </a:solidFill>
+              <a:round/>
+            </a:ln>
+            <a:effectLst/>
+          </c:spPr>
+          <c:marker>
+            <c:symbol val="none"/>
+          </c:marker>
+          <c:xVal>
+            <c:numRef>
+              <c:f>Sheet1!$A$7:$A$8</c:f>
+              <c:numCache>
+                <c:formatCode>General</c:formatCode>
+                <c:ptCount val="2"/>
+                <c:pt idx="0">
+                  <c:v>0</c:v>
+                </c:pt>
+                <c:pt idx="1">
+                  <c:v>1.4</c:v>
+                </c:pt>
+              </c:numCache>
+            </c:numRef>
+          </c:xVal>
+          <c:yVal>
+            <c:numRef>
+              <c:f>Sheet1!$B$7:$B$8</c:f>
+              <c:numCache>
+                <c:formatCode>General</c:formatCode>
+                <c:ptCount val="2"/>
+                <c:pt idx="0">
+                  <c:v>1.0429999999999999</c:v>
+                </c:pt>
+                <c:pt idx="1">
+                  <c:v>0.32199999999999995</c:v>
+                </c:pt>
+              </c:numCache>
+            </c:numRef>
+          </c:yVal>
+          <c:smooth val="0"/>
+          <c:extLst>
+            <c:ext xmlns:c16="http://schemas.microsoft.com/office/drawing/2014/chart" uri="{C3380CC4-5D6E-409C-BE32-E72D297353CC}">
+              <c16:uniqueId val="{00000006-7DA5-E446-857E-1A442F19ED87}"/>
+            </c:ext>
+          </c:extLst>
+        </c:ser>
+        <c:dLbls>
+          <c:showLegendKey val="0"/>
+          <c:showVal val="0"/>
+          <c:showCatName val="0"/>
+          <c:showSerName val="0"/>
+          <c:showPercent val="0"/>
+          <c:showBubbleSize val="0"/>
+        </c:dLbls>
+        <c:axId val="1627999344"/>
+        <c:axId val="1627980240"/>
+      </c:scatterChart>
+      <c:valAx>
+        <c:axId val="1627999344"/>
+        <c:scaling>
+          <c:orientation val="minMax"/>
+        </c:scaling>
+        <c:delete val="0"/>
+        <c:axPos val="b"/>
+        <c:title>
+          <c:tx>
+            <c:rich>
+              <a:bodyPr rot="0" spcFirstLastPara="1" vertOverflow="ellipsis" vert="horz" wrap="square" anchor="ctr" anchorCtr="1"/>
+              <a:lstStyle/>
+              <a:p>
+                <a:pPr>
+                  <a:defRPr sz="1800" b="0" i="0" u="none" strike="noStrike" kern="1200" baseline="0">
+                    <a:solidFill>
+                      <a:schemeClr val="tx1">
+                        <a:lumMod val="65000"/>
+                        <a:lumOff val="35000"/>
+                      </a:schemeClr>
+                    </a:solidFill>
+                    <a:latin typeface="Arial" panose="020B0604020202020204" pitchFamily="34" charset="0"/>
+                    <a:ea typeface="+mn-ea"/>
+                    <a:cs typeface="Arial" panose="020B0604020202020204" pitchFamily="34" charset="0"/>
+                  </a:defRPr>
+                </a:pPr>
+                <a:r>
+                  <a:rPr lang="en-US"/>
+                  <a:t>Δ: phenyl-metal</a:t>
+                </a:r>
+                <a:r>
+                  <a:rPr lang="en-US" baseline="0"/>
+                  <a:t> binding enegy, eV</a:t>
+                </a:r>
+                <a:endParaRPr lang="en-US"/>
+              </a:p>
+            </c:rich>
+          </c:tx>
+          <c:overlay val="0"/>
+          <c:spPr>
+            <a:noFill/>
+            <a:ln>
+              <a:noFill/>
+            </a:ln>
+            <a:effectLst/>
+          </c:spPr>
+          <c:txPr>
+            <a:bodyPr rot="0" spcFirstLastPara="1" vertOverflow="ellipsis" vert="horz" wrap="square" anchor="ctr" anchorCtr="1"/>
+            <a:lstStyle/>
+            <a:p>
+              <a:pPr>
+                <a:defRPr sz="1800" b="0" i="0" u="none" strike="noStrike" kern="1200" baseline="0">
+                  <a:solidFill>
+                    <a:schemeClr val="tx1">
+                      <a:lumMod val="65000"/>
+                      <a:lumOff val="35000"/>
+                    </a:schemeClr>
+                  </a:solidFill>
+                  <a:latin typeface="Arial" panose="020B0604020202020204" pitchFamily="34" charset="0"/>
+                  <a:ea typeface="+mn-ea"/>
+                  <a:cs typeface="Arial" panose="020B0604020202020204" pitchFamily="34" charset="0"/>
+                </a:defRPr>
+              </a:pPr>
+              <a:endParaRPr lang="en-US"/>
+            </a:p>
+          </c:txPr>
+        </c:title>
+        <c:numFmt formatCode="General" sourceLinked="1"/>
+        <c:majorTickMark val="in"/>
+        <c:minorTickMark val="none"/>
+        <c:tickLblPos val="nextTo"/>
+        <c:spPr>
+          <a:noFill/>
+          <a:ln w="9525" cap="flat" cmpd="sng" algn="ctr">
+            <a:solidFill>
+              <a:schemeClr val="tx1">
+                <a:lumMod val="25000"/>
+                <a:lumOff val="75000"/>
+              </a:schemeClr>
+            </a:solidFill>
+            <a:round/>
+          </a:ln>
+          <a:effectLst/>
+        </c:spPr>
+        <c:txPr>
+          <a:bodyPr rot="-60000000" spcFirstLastPara="1" vertOverflow="ellipsis" vert="horz" wrap="square" anchor="ctr" anchorCtr="1"/>
+          <a:lstStyle/>
+          <a:p>
+            <a:pPr>
+              <a:defRPr sz="1800" b="0" i="0" u="none" strike="noStrike" kern="1200" baseline="0">
+                <a:solidFill>
+                  <a:schemeClr val="tx1">
+                    <a:lumMod val="65000"/>
+                    <a:lumOff val="35000"/>
+                  </a:schemeClr>
+                </a:solidFill>
+                <a:latin typeface="Arial" panose="020B0604020202020204" pitchFamily="34" charset="0"/>
+                <a:ea typeface="+mn-ea"/>
+                <a:cs typeface="Arial" panose="020B0604020202020204" pitchFamily="34" charset="0"/>
+              </a:defRPr>
+            </a:pPr>
+            <a:endParaRPr lang="en-US"/>
+          </a:p>
+        </c:txPr>
+        <c:crossAx val="1627980240"/>
+        <c:crosses val="autoZero"/>
+        <c:crossBetween val="midCat"/>
+      </c:valAx>
+      <c:valAx>
+        <c:axId val="1627980240"/>
+        <c:scaling>
+          <c:orientation val="minMax"/>
+          <c:max val="1.9"/>
+          <c:min val="0.5"/>
+        </c:scaling>
+        <c:delete val="0"/>
+        <c:axPos val="l"/>
+        <c:title>
+          <c:tx>
+            <c:rich>
+              <a:bodyPr rot="-5400000" spcFirstLastPara="1" vertOverflow="ellipsis" vert="horz" wrap="square" anchor="t" anchorCtr="0"/>
+              <a:lstStyle/>
+              <a:p>
+                <a:pPr>
+                  <a:defRPr sz="1800" b="0" i="0" u="none" strike="noStrike" kern="1200" baseline="0">
+                    <a:solidFill>
+                      <a:schemeClr val="tx1">
+                        <a:lumMod val="65000"/>
+                        <a:lumOff val="35000"/>
+                      </a:schemeClr>
+                    </a:solidFill>
+                    <a:latin typeface="Arial" panose="020B0604020202020204" pitchFamily="34" charset="0"/>
+                    <a:ea typeface="+mn-ea"/>
+                    <a:cs typeface="Arial" panose="020B0604020202020204" pitchFamily="34" charset="0"/>
+                  </a:defRPr>
+                </a:pPr>
+                <a:r>
+                  <a:rPr lang="en-US"/>
+                  <a:t>Energy of unassisted extraction</a:t>
+                </a:r>
+                <a:r>
+                  <a:rPr lang="en-US" baseline="0"/>
+                  <a:t>, eV</a:t>
+                </a:r>
+                <a:endParaRPr lang="en-US"/>
+              </a:p>
+            </c:rich>
+          </c:tx>
+          <c:overlay val="0"/>
+          <c:spPr>
+            <a:noFill/>
+            <a:ln w="41275">
+              <a:noFill/>
+            </a:ln>
+            <a:effectLst/>
+          </c:spPr>
+          <c:txPr>
+            <a:bodyPr rot="-5400000" spcFirstLastPara="1" vertOverflow="ellipsis" vert="horz" wrap="square" anchor="t" anchorCtr="0"/>
+            <a:lstStyle/>
+            <a:p>
+              <a:pPr>
+                <a:defRPr sz="1800" b="0" i="0" u="none" strike="noStrike" kern="1200" baseline="0">
+                  <a:solidFill>
+                    <a:schemeClr val="tx1">
+                      <a:lumMod val="65000"/>
+                      <a:lumOff val="35000"/>
+                    </a:schemeClr>
+                  </a:solidFill>
+                  <a:latin typeface="Arial" panose="020B0604020202020204" pitchFamily="34" charset="0"/>
+                  <a:ea typeface="+mn-ea"/>
+                  <a:cs typeface="Arial" panose="020B0604020202020204" pitchFamily="34" charset="0"/>
+                </a:defRPr>
+              </a:pPr>
+              <a:endParaRPr lang="en-US"/>
+            </a:p>
+          </c:txPr>
+        </c:title>
+        <c:numFmt formatCode="General" sourceLinked="1"/>
+        <c:majorTickMark val="in"/>
+        <c:minorTickMark val="none"/>
+        <c:tickLblPos val="nextTo"/>
+        <c:spPr>
+          <a:noFill/>
+          <a:ln w="9525" cap="flat" cmpd="sng" algn="ctr">
+            <a:solidFill>
+              <a:schemeClr val="tx1">
+                <a:lumMod val="25000"/>
+                <a:lumOff val="75000"/>
+              </a:schemeClr>
+            </a:solidFill>
+            <a:round/>
+          </a:ln>
+          <a:effectLst/>
+        </c:spPr>
+        <c:txPr>
+          <a:bodyPr rot="-60000000" spcFirstLastPara="1" vertOverflow="ellipsis" vert="horz" wrap="square" anchor="ctr" anchorCtr="1"/>
+          <a:lstStyle/>
+          <a:p>
+            <a:pPr>
+              <a:defRPr sz="1800" b="0" i="0" u="none" strike="noStrike" kern="1200" baseline="0">
+                <a:solidFill>
+                  <a:schemeClr val="tx1">
+                    <a:lumMod val="65000"/>
+                    <a:lumOff val="35000"/>
+                  </a:schemeClr>
+                </a:solidFill>
+                <a:latin typeface="Arial" panose="020B0604020202020204" pitchFamily="34" charset="0"/>
+                <a:ea typeface="+mn-ea"/>
+                <a:cs typeface="Arial" panose="020B0604020202020204" pitchFamily="34" charset="0"/>
+              </a:defRPr>
+            </a:pPr>
+            <a:endParaRPr lang="en-US"/>
+          </a:p>
+        </c:txPr>
+        <c:crossAx val="1627999344"/>
+        <c:crosses val="autoZero"/>
+        <c:crossBetween val="midCat"/>
+      </c:valAx>
+      <c:spPr>
+        <a:noFill/>
+        <a:ln>
+          <a:solidFill>
+            <a:schemeClr val="tx1">
+              <a:lumMod val="25000"/>
+              <a:lumOff val="75000"/>
+            </a:schemeClr>
+          </a:solidFill>
+        </a:ln>
+        <a:effectLst/>
+      </c:spPr>
+    </c:plotArea>
+    <c:plotVisOnly val="1"/>
+    <c:dispBlanksAs val="gap"/>
+    <c:extLst>
+      <c:ext xmlns:c16r3="http://schemas.microsoft.com/office/drawing/2017/03/chart" uri="{56B9EC1D-385E-4148-901F-78D8002777C0}">
+        <c16r3:dataDisplayOptions16>
+          <c16r3:dispNaAsBlank val="1"/>
+        </c16r3:dataDisplayOptions16>
+      </c:ext>
+    </c:extLst>
+    <c:showDLblsOverMax val="0"/>
+  </c:chart>
+  <c:spPr>
+    <a:solidFill>
+      <a:schemeClr val="bg1"/>
+    </a:solidFill>
+    <a:ln w="9525" cap="flat" cmpd="sng" algn="ctr">
+      <a:noFill/>
+      <a:round/>
+    </a:ln>
+    <a:effectLst/>
+  </c:spPr>
+  <c:txPr>
+    <a:bodyPr/>
+    <a:lstStyle/>
+    <a:p>
+      <a:pPr>
+        <a:defRPr sz="1800" b="0" i="0">
+          <a:latin typeface="Arial" panose="020B0604020202020204" pitchFamily="34" charset="0"/>
+          <a:cs typeface="Arial" panose="020B0604020202020204" pitchFamily="34" charset="0"/>
+        </a:defRPr>
+      </a:pPr>
+      <a:endParaRPr lang="en-US"/>
+    </a:p>
+  </c:txPr>
+  <c:externalData r:id="rId3">
+    <c:autoUpdate val="0"/>
+  </c:externalData>
+  <c:userShapes r:id="rId4"/>
+</c:chartSpace>
+</file>
+
 <file path=ppt/charts/colors1.xml><?xml version="1.0" encoding="utf-8"?>
+<cs:colorStyle xmlns:cs="http://schemas.microsoft.com/office/drawing/2012/chartStyle" xmlns:a="http://schemas.openxmlformats.org/drawingml/2006/main" meth="cycle" id="10">
+  <a:schemeClr val="accent1"/>
+  <a:schemeClr val="accent2"/>
+  <a:schemeClr val="accent3"/>
+  <a:schemeClr val="accent4"/>
+  <a:schemeClr val="accent5"/>
+  <a:schemeClr val="accent6"/>
+  <cs:variation/>
+  <cs:variation>
+    <a:lumMod val="60000"/>
+  </cs:variation>
+  <cs:variation>
+    <a:lumMod val="80000"/>
+    <a:lumOff val="20000"/>
+  </cs:variation>
+  <cs:variation>
+    <a:lumMod val="80000"/>
+  </cs:variation>
+  <cs:variation>
+    <a:lumMod val="60000"/>
+    <a:lumOff val="40000"/>
+  </cs:variation>
+  <cs:variation>
+    <a:lumMod val="50000"/>
+  </cs:variation>
+  <cs:variation>
+    <a:lumMod val="70000"/>
+    <a:lumOff val="30000"/>
+  </cs:variation>
+  <cs:variation>
+    <a:lumMod val="70000"/>
+  </cs:variation>
+  <cs:variation>
+    <a:lumMod val="50000"/>
+    <a:lumOff val="50000"/>
+  </cs:variation>
+</cs:colorStyle>
+</file>
+
+<file path=ppt/charts/colors2.xml><?xml version="1.0" encoding="utf-8"?>
 <cs:colorStyle xmlns:cs="http://schemas.microsoft.com/office/drawing/2012/chartStyle" xmlns:a="http://schemas.openxmlformats.org/drawingml/2006/main" meth="cycle" id="10">
   <a:schemeClr val="accent1"/>
   <a:schemeClr val="accent2"/>
@@ -1084,6 +1808,956 @@
 </cs:chartStyle>
 </file>
 
+<file path=ppt/charts/style2.xml><?xml version="1.0" encoding="utf-8"?>
+<cs:chartStyle xmlns:cs="http://schemas.microsoft.com/office/drawing/2012/chartStyle" xmlns:a="http://schemas.openxmlformats.org/drawingml/2006/main" id="240">
+  <cs:axisTitle>
+    <cs:lnRef idx="0"/>
+    <cs:fillRef idx="0"/>
+    <cs:effectRef idx="0"/>
+    <cs:fontRef idx="minor">
+      <a:schemeClr val="tx1">
+        <a:lumMod val="65000"/>
+        <a:lumOff val="35000"/>
+      </a:schemeClr>
+    </cs:fontRef>
+    <cs:defRPr sz="1000" kern="1200"/>
+  </cs:axisTitle>
+  <cs:categoryAxis>
+    <cs:lnRef idx="0"/>
+    <cs:fillRef idx="0"/>
+    <cs:effectRef idx="0"/>
+    <cs:fontRef idx="minor">
+      <a:schemeClr val="tx1">
+        <a:lumMod val="65000"/>
+        <a:lumOff val="35000"/>
+      </a:schemeClr>
+    </cs:fontRef>
+    <cs:spPr>
+      <a:ln w="9525" cap="flat" cmpd="sng" algn="ctr">
+        <a:solidFill>
+          <a:schemeClr val="tx1">
+            <a:lumMod val="25000"/>
+            <a:lumOff val="75000"/>
+          </a:schemeClr>
+        </a:solidFill>
+        <a:round/>
+      </a:ln>
+    </cs:spPr>
+    <cs:defRPr sz="900" kern="1200"/>
+  </cs:categoryAxis>
+  <cs:chartArea mods="allowNoFillOverride allowNoLineOverride">
+    <cs:lnRef idx="0"/>
+    <cs:fillRef idx="0"/>
+    <cs:effectRef idx="0"/>
+    <cs:fontRef idx="minor">
+      <a:schemeClr val="tx1"/>
+    </cs:fontRef>
+    <cs:spPr>
+      <a:solidFill>
+        <a:schemeClr val="bg1"/>
+      </a:solidFill>
+      <a:ln w="9525" cap="flat" cmpd="sng" algn="ctr">
+        <a:solidFill>
+          <a:schemeClr val="tx1">
+            <a:lumMod val="15000"/>
+            <a:lumOff val="85000"/>
+          </a:schemeClr>
+        </a:solidFill>
+        <a:round/>
+      </a:ln>
+    </cs:spPr>
+    <cs:defRPr sz="1000" kern="1200"/>
+  </cs:chartArea>
+  <cs:dataLabel>
+    <cs:lnRef idx="0"/>
+    <cs:fillRef idx="0"/>
+    <cs:effectRef idx="0"/>
+    <cs:fontRef idx="minor">
+      <a:schemeClr val="tx1">
+        <a:lumMod val="75000"/>
+        <a:lumOff val="25000"/>
+      </a:schemeClr>
+    </cs:fontRef>
+    <cs:defRPr sz="900" kern="1200"/>
+  </cs:dataLabel>
+  <cs:dataLabelCallout>
+    <cs:lnRef idx="0"/>
+    <cs:fillRef idx="0"/>
+    <cs:effectRef idx="0"/>
+    <cs:fontRef idx="minor">
+      <a:schemeClr val="dk1">
+        <a:lumMod val="65000"/>
+        <a:lumOff val="35000"/>
+      </a:schemeClr>
+    </cs:fontRef>
+    <cs:spPr>
+      <a:solidFill>
+        <a:schemeClr val="lt1"/>
+      </a:solidFill>
+      <a:ln>
+        <a:solidFill>
+          <a:schemeClr val="dk1">
+            <a:lumMod val="25000"/>
+            <a:lumOff val="75000"/>
+          </a:schemeClr>
+        </a:solidFill>
+      </a:ln>
+    </cs:spPr>
+    <cs:defRPr sz="900" kern="1200"/>
+    <cs:bodyPr rot="0" spcFirstLastPara="1" vertOverflow="clip" horzOverflow="clip" vert="horz" wrap="square" lIns="36576" tIns="18288" rIns="36576" bIns="18288" anchor="ctr" anchorCtr="1">
+      <a:spAutoFit/>
+    </cs:bodyPr>
+  </cs:dataLabelCallout>
+  <cs:dataPoint>
+    <cs:lnRef idx="0"/>
+    <cs:fillRef idx="1">
+      <cs:styleClr val="auto"/>
+    </cs:fillRef>
+    <cs:effectRef idx="0"/>
+    <cs:fontRef idx="minor">
+      <a:schemeClr val="tx1"/>
+    </cs:fontRef>
+  </cs:dataPoint>
+  <cs:dataPoint3D>
+    <cs:lnRef idx="0"/>
+    <cs:fillRef idx="1">
+      <cs:styleClr val="auto"/>
+    </cs:fillRef>
+    <cs:effectRef idx="0"/>
+    <cs:fontRef idx="minor">
+      <a:schemeClr val="tx1"/>
+    </cs:fontRef>
+  </cs:dataPoint3D>
+  <cs:dataPointLine>
+    <cs:lnRef idx="0">
+      <cs:styleClr val="auto"/>
+    </cs:lnRef>
+    <cs:fillRef idx="1"/>
+    <cs:effectRef idx="0"/>
+    <cs:fontRef idx="minor">
+      <a:schemeClr val="tx1"/>
+    </cs:fontRef>
+    <cs:spPr>
+      <a:ln w="19050" cap="rnd">
+        <a:solidFill>
+          <a:schemeClr val="phClr"/>
+        </a:solidFill>
+        <a:round/>
+      </a:ln>
+    </cs:spPr>
+  </cs:dataPointLine>
+  <cs:dataPointMarker>
+    <cs:lnRef idx="0">
+      <cs:styleClr val="auto"/>
+    </cs:lnRef>
+    <cs:fillRef idx="1">
+      <cs:styleClr val="auto"/>
+    </cs:fillRef>
+    <cs:effectRef idx="0"/>
+    <cs:fontRef idx="minor">
+      <a:schemeClr val="tx1"/>
+    </cs:fontRef>
+    <cs:spPr>
+      <a:ln w="9525">
+        <a:solidFill>
+          <a:schemeClr val="phClr"/>
+        </a:solidFill>
+      </a:ln>
+    </cs:spPr>
+  </cs:dataPointMarker>
+  <cs:dataPointMarkerLayout symbol="circle" size="5"/>
+  <cs:dataPointWireframe>
+    <cs:lnRef idx="0">
+      <cs:styleClr val="auto"/>
+    </cs:lnRef>
+    <cs:fillRef idx="0"/>
+    <cs:effectRef idx="0"/>
+    <cs:fontRef idx="minor">
+      <a:schemeClr val="dk1"/>
+    </cs:fontRef>
+    <cs:spPr>
+      <a:ln w="9525" cap="rnd">
+        <a:solidFill>
+          <a:schemeClr val="phClr"/>
+        </a:solidFill>
+        <a:round/>
+      </a:ln>
+    </cs:spPr>
+  </cs:dataPointWireframe>
+  <cs:dataTable>
+    <cs:lnRef idx="0"/>
+    <cs:fillRef idx="0"/>
+    <cs:effectRef idx="0"/>
+    <cs:fontRef idx="minor">
+      <a:schemeClr val="tx1">
+        <a:lumMod val="65000"/>
+        <a:lumOff val="35000"/>
+      </a:schemeClr>
+    </cs:fontRef>
+    <cs:spPr>
+      <a:noFill/>
+      <a:ln w="9525" cap="flat" cmpd="sng" algn="ctr">
+        <a:solidFill>
+          <a:schemeClr val="tx1">
+            <a:lumMod val="15000"/>
+            <a:lumOff val="85000"/>
+          </a:schemeClr>
+        </a:solidFill>
+        <a:round/>
+      </a:ln>
+    </cs:spPr>
+    <cs:defRPr sz="900" kern="1200"/>
+  </cs:dataTable>
+  <cs:downBar>
+    <cs:lnRef idx="0"/>
+    <cs:fillRef idx="0"/>
+    <cs:effectRef idx="0"/>
+    <cs:fontRef idx="minor">
+      <a:schemeClr val="tx1"/>
+    </cs:fontRef>
+    <cs:spPr>
+      <a:solidFill>
+        <a:schemeClr val="dk1">
+          <a:lumMod val="75000"/>
+          <a:lumOff val="25000"/>
+        </a:schemeClr>
+      </a:solidFill>
+      <a:ln w="9525" cap="flat" cmpd="sng" algn="ctr">
+        <a:solidFill>
+          <a:schemeClr val="tx1">
+            <a:lumMod val="65000"/>
+            <a:lumOff val="35000"/>
+          </a:schemeClr>
+        </a:solidFill>
+        <a:round/>
+      </a:ln>
+    </cs:spPr>
+  </cs:downBar>
+  <cs:dropLine>
+    <cs:lnRef idx="0"/>
+    <cs:fillRef idx="0"/>
+    <cs:effectRef idx="0"/>
+    <cs:fontRef idx="minor">
+      <a:schemeClr val="tx1"/>
+    </cs:fontRef>
+    <cs:spPr>
+      <a:ln w="9525" cap="flat" cmpd="sng" algn="ctr">
+        <a:solidFill>
+          <a:schemeClr val="tx1">
+            <a:lumMod val="35000"/>
+            <a:lumOff val="65000"/>
+          </a:schemeClr>
+        </a:solidFill>
+        <a:round/>
+      </a:ln>
+    </cs:spPr>
+  </cs:dropLine>
+  <cs:errorBar>
+    <cs:lnRef idx="0"/>
+    <cs:fillRef idx="0"/>
+    <cs:effectRef idx="0"/>
+    <cs:fontRef idx="minor">
+      <a:schemeClr val="tx1"/>
+    </cs:fontRef>
+    <cs:spPr>
+      <a:ln w="9525" cap="flat" cmpd="sng" algn="ctr">
+        <a:solidFill>
+          <a:schemeClr val="tx1">
+            <a:lumMod val="65000"/>
+            <a:lumOff val="35000"/>
+          </a:schemeClr>
+        </a:solidFill>
+        <a:round/>
+      </a:ln>
+    </cs:spPr>
+  </cs:errorBar>
+  <cs:floor>
+    <cs:lnRef idx="0"/>
+    <cs:fillRef idx="0"/>
+    <cs:effectRef idx="0"/>
+    <cs:fontRef idx="minor">
+      <a:schemeClr val="tx1"/>
+    </cs:fontRef>
+    <cs:spPr>
+      <a:noFill/>
+      <a:ln>
+        <a:noFill/>
+      </a:ln>
+    </cs:spPr>
+  </cs:floor>
+  <cs:gridlineMajor>
+    <cs:lnRef idx="0"/>
+    <cs:fillRef idx="0"/>
+    <cs:effectRef idx="0"/>
+    <cs:fontRef idx="minor">
+      <a:schemeClr val="tx1"/>
+    </cs:fontRef>
+    <cs:spPr>
+      <a:ln w="9525" cap="flat" cmpd="sng" algn="ctr">
+        <a:solidFill>
+          <a:schemeClr val="tx1">
+            <a:lumMod val="15000"/>
+            <a:lumOff val="85000"/>
+          </a:schemeClr>
+        </a:solidFill>
+        <a:round/>
+      </a:ln>
+    </cs:spPr>
+  </cs:gridlineMajor>
+  <cs:gridlineMinor>
+    <cs:lnRef idx="0"/>
+    <cs:fillRef idx="0"/>
+    <cs:effectRef idx="0"/>
+    <cs:fontRef idx="minor">
+      <a:schemeClr val="tx1"/>
+    </cs:fontRef>
+    <cs:spPr>
+      <a:ln w="9525" cap="flat" cmpd="sng" algn="ctr">
+        <a:solidFill>
+          <a:schemeClr val="tx1">
+            <a:lumMod val="5000"/>
+            <a:lumOff val="95000"/>
+          </a:schemeClr>
+        </a:solidFill>
+        <a:round/>
+      </a:ln>
+    </cs:spPr>
+  </cs:gridlineMinor>
+  <cs:hiLoLine>
+    <cs:lnRef idx="0"/>
+    <cs:fillRef idx="0"/>
+    <cs:effectRef idx="0"/>
+    <cs:fontRef idx="minor">
+      <a:schemeClr val="tx1"/>
+    </cs:fontRef>
+    <cs:spPr>
+      <a:ln w="9525" cap="flat" cmpd="sng" algn="ctr">
+        <a:solidFill>
+          <a:schemeClr val="tx1">
+            <a:lumMod val="50000"/>
+            <a:lumOff val="50000"/>
+          </a:schemeClr>
+        </a:solidFill>
+        <a:round/>
+      </a:ln>
+    </cs:spPr>
+  </cs:hiLoLine>
+  <cs:leaderLine>
+    <cs:lnRef idx="0"/>
+    <cs:fillRef idx="0"/>
+    <cs:effectRef idx="0"/>
+    <cs:fontRef idx="minor">
+      <a:schemeClr val="tx1"/>
+    </cs:fontRef>
+    <cs:spPr>
+      <a:ln w="9525" cap="flat" cmpd="sng" algn="ctr">
+        <a:solidFill>
+          <a:schemeClr val="tx1">
+            <a:lumMod val="35000"/>
+            <a:lumOff val="65000"/>
+          </a:schemeClr>
+        </a:solidFill>
+        <a:round/>
+      </a:ln>
+    </cs:spPr>
+  </cs:leaderLine>
+  <cs:legend>
+    <cs:lnRef idx="0"/>
+    <cs:fillRef idx="0"/>
+    <cs:effectRef idx="0"/>
+    <cs:fontRef idx="minor">
+      <a:schemeClr val="tx1">
+        <a:lumMod val="65000"/>
+        <a:lumOff val="35000"/>
+      </a:schemeClr>
+    </cs:fontRef>
+    <cs:defRPr sz="900" kern="1200"/>
+  </cs:legend>
+  <cs:plotArea mods="allowNoFillOverride allowNoLineOverride">
+    <cs:lnRef idx="0"/>
+    <cs:fillRef idx="0"/>
+    <cs:effectRef idx="0"/>
+    <cs:fontRef idx="minor">
+      <a:schemeClr val="tx1"/>
+    </cs:fontRef>
+  </cs:plotArea>
+  <cs:plotArea3D mods="allowNoFillOverride allowNoLineOverride">
+    <cs:lnRef idx="0"/>
+    <cs:fillRef idx="0"/>
+    <cs:effectRef idx="0"/>
+    <cs:fontRef idx="minor">
+      <a:schemeClr val="tx1"/>
+    </cs:fontRef>
+  </cs:plotArea3D>
+  <cs:seriesAxis>
+    <cs:lnRef idx="0"/>
+    <cs:fillRef idx="0"/>
+    <cs:effectRef idx="0"/>
+    <cs:fontRef idx="minor">
+      <a:schemeClr val="tx1">
+        <a:lumMod val="65000"/>
+        <a:lumOff val="35000"/>
+      </a:schemeClr>
+    </cs:fontRef>
+    <cs:defRPr sz="900" kern="1200"/>
+  </cs:seriesAxis>
+  <cs:seriesLine>
+    <cs:lnRef idx="0"/>
+    <cs:fillRef idx="0"/>
+    <cs:effectRef idx="0"/>
+    <cs:fontRef idx="minor">
+      <a:schemeClr val="tx1"/>
+    </cs:fontRef>
+    <cs:spPr>
+      <a:ln w="9525" cap="flat" cmpd="sng" algn="ctr">
+        <a:solidFill>
+          <a:schemeClr val="tx1">
+            <a:lumMod val="35000"/>
+            <a:lumOff val="65000"/>
+          </a:schemeClr>
+        </a:solidFill>
+        <a:round/>
+      </a:ln>
+    </cs:spPr>
+  </cs:seriesLine>
+  <cs:title>
+    <cs:lnRef idx="0"/>
+    <cs:fillRef idx="0"/>
+    <cs:effectRef idx="0"/>
+    <cs:fontRef idx="minor">
+      <a:schemeClr val="tx1">
+        <a:lumMod val="65000"/>
+        <a:lumOff val="35000"/>
+      </a:schemeClr>
+    </cs:fontRef>
+    <cs:defRPr sz="1400" b="0" kern="1200" spc="0" baseline="0"/>
+  </cs:title>
+  <cs:trendline>
+    <cs:lnRef idx="0">
+      <cs:styleClr val="auto"/>
+    </cs:lnRef>
+    <cs:fillRef idx="0"/>
+    <cs:effectRef idx="0"/>
+    <cs:fontRef idx="minor">
+      <a:schemeClr val="tx1"/>
+    </cs:fontRef>
+    <cs:spPr>
+      <a:ln w="19050" cap="rnd">
+        <a:solidFill>
+          <a:schemeClr val="phClr"/>
+        </a:solidFill>
+        <a:prstDash val="sysDot"/>
+      </a:ln>
+    </cs:spPr>
+  </cs:trendline>
+  <cs:trendlineLabel>
+    <cs:lnRef idx="0"/>
+    <cs:fillRef idx="0"/>
+    <cs:effectRef idx="0"/>
+    <cs:fontRef idx="minor">
+      <a:schemeClr val="tx1">
+        <a:lumMod val="65000"/>
+        <a:lumOff val="35000"/>
+      </a:schemeClr>
+    </cs:fontRef>
+    <cs:defRPr sz="900" kern="1200"/>
+  </cs:trendlineLabel>
+  <cs:upBar>
+    <cs:lnRef idx="0"/>
+    <cs:fillRef idx="0"/>
+    <cs:effectRef idx="0"/>
+    <cs:fontRef idx="minor">
+      <a:schemeClr val="tx1"/>
+    </cs:fontRef>
+    <cs:spPr>
+      <a:solidFill>
+        <a:schemeClr val="lt1"/>
+      </a:solidFill>
+      <a:ln w="9525" cap="flat" cmpd="sng" algn="ctr">
+        <a:solidFill>
+          <a:schemeClr val="tx1">
+            <a:lumMod val="65000"/>
+            <a:lumOff val="35000"/>
+          </a:schemeClr>
+        </a:solidFill>
+        <a:round/>
+      </a:ln>
+    </cs:spPr>
+  </cs:upBar>
+  <cs:valueAxis>
+    <cs:lnRef idx="0"/>
+    <cs:fillRef idx="0"/>
+    <cs:effectRef idx="0"/>
+    <cs:fontRef idx="minor">
+      <a:schemeClr val="tx1">
+        <a:lumMod val="65000"/>
+        <a:lumOff val="35000"/>
+      </a:schemeClr>
+    </cs:fontRef>
+    <cs:spPr>
+      <a:ln w="9525" cap="flat" cmpd="sng" algn="ctr">
+        <a:solidFill>
+          <a:schemeClr val="tx1">
+            <a:lumMod val="25000"/>
+            <a:lumOff val="75000"/>
+          </a:schemeClr>
+        </a:solidFill>
+        <a:round/>
+      </a:ln>
+    </cs:spPr>
+    <cs:defRPr sz="900" kern="1200"/>
+  </cs:valueAxis>
+  <cs:wall>
+    <cs:lnRef idx="0"/>
+    <cs:fillRef idx="0"/>
+    <cs:effectRef idx="0"/>
+    <cs:fontRef idx="minor">
+      <a:schemeClr val="tx1"/>
+    </cs:fontRef>
+    <cs:spPr>
+      <a:noFill/>
+      <a:ln>
+        <a:noFill/>
+      </a:ln>
+    </cs:spPr>
+  </cs:wall>
+</cs:chartStyle>
+</file>
+
+<file path=ppt/drawings/drawing1.xml><?xml version="1.0" encoding="utf-8"?>
+<c:userShapes xmlns:c="http://schemas.openxmlformats.org/drawingml/2006/chart">
+  <cdr:relSizeAnchor xmlns:cdr="http://schemas.openxmlformats.org/drawingml/2006/chartDrawing">
+    <cdr:from>
+      <cdr:x>0.46337</cdr:x>
+      <cdr:y>0.54369</cdr:y>
+    </cdr:from>
+    <cdr:to>
+      <cdr:x>0.58603</cdr:x>
+      <cdr:y>0.71845</cdr:y>
+    </cdr:to>
+    <cdr:sp macro="" textlink="">
+      <cdr:nvSpPr>
+        <cdr:cNvPr id="2" name="TextBox 1">
+          <a:extLst xmlns:a="http://schemas.openxmlformats.org/drawingml/2006/main">
+            <a:ext uri="{FF2B5EF4-FFF2-40B4-BE49-F238E27FC236}">
+              <a16:creationId xmlns:a16="http://schemas.microsoft.com/office/drawing/2014/main" id="{404879A4-9151-D749-93AC-0EE43A7750FC}"/>
+            </a:ext>
+          </a:extLst>
+        </cdr:cNvPr>
+        <cdr:cNvSpPr txBox="1"/>
+      </cdr:nvSpPr>
+      <cdr:spPr>
+        <a:xfrm xmlns:a="http://schemas.openxmlformats.org/drawingml/2006/main">
+          <a:off x="3454400" y="2844800"/>
+          <a:ext cx="914400" cy="914400"/>
+        </a:xfrm>
+        <a:prstGeom xmlns:a="http://schemas.openxmlformats.org/drawingml/2006/main" prst="rect">
+          <a:avLst/>
+        </a:prstGeom>
+      </cdr:spPr>
+      <cdr:txBody>
+        <a:bodyPr xmlns:a="http://schemas.openxmlformats.org/drawingml/2006/main" vertOverflow="clip" wrap="none" rtlCol="0"/>
+        <a:lstStyle xmlns:a="http://schemas.openxmlformats.org/drawingml/2006/main"/>
+        <a:p xmlns:a="http://schemas.openxmlformats.org/drawingml/2006/main">
+          <a:endParaRPr lang="en-US" sz="1100"/>
+        </a:p>
+      </cdr:txBody>
+    </cdr:sp>
+  </cdr:relSizeAnchor>
+  <cdr:relSizeAnchor xmlns:cdr="http://schemas.openxmlformats.org/drawingml/2006/chartDrawing">
+    <cdr:from>
+      <cdr:x>0.14713</cdr:x>
+      <cdr:y>0.69947</cdr:y>
+    </cdr:from>
+    <cdr:to>
+      <cdr:x>0.44302</cdr:x>
+      <cdr:y>0.78232</cdr:y>
+    </cdr:to>
+    <cdr:sp macro="" textlink="">
+      <cdr:nvSpPr>
+        <cdr:cNvPr id="3" name="TextBox 2">
+          <a:extLst xmlns:a="http://schemas.openxmlformats.org/drawingml/2006/main">
+            <a:ext uri="{FF2B5EF4-FFF2-40B4-BE49-F238E27FC236}">
+              <a16:creationId xmlns:a16="http://schemas.microsoft.com/office/drawing/2014/main" id="{806DF1B4-B736-C24F-9D6C-56480FCDD469}"/>
+            </a:ext>
+          </a:extLst>
+        </cdr:cNvPr>
+        <cdr:cNvSpPr txBox="1"/>
+      </cdr:nvSpPr>
+      <cdr:spPr>
+        <a:xfrm xmlns:a="http://schemas.openxmlformats.org/drawingml/2006/main">
+          <a:off x="1103253" y="3338177"/>
+          <a:ext cx="2218704" cy="395399"/>
+        </a:xfrm>
+        <a:prstGeom xmlns:a="http://schemas.openxmlformats.org/drawingml/2006/main" prst="rect">
+          <a:avLst/>
+        </a:prstGeom>
+      </cdr:spPr>
+      <cdr:txBody>
+        <a:bodyPr xmlns:a="http://schemas.openxmlformats.org/drawingml/2006/main" vertOverflow="clip" wrap="square" rtlCol="0" anchor="ctr" anchorCtr="1"/>
+        <a:lstStyle xmlns:a="http://schemas.openxmlformats.org/drawingml/2006/main"/>
+        <a:p xmlns:a="http://schemas.openxmlformats.org/drawingml/2006/main">
+          <a:pPr algn="ctr"/>
+          <a:r>
+            <a:rPr lang="en-US" sz="1800" b="0" i="0">
+              <a:solidFill>
+                <a:srgbClr val="00B050"/>
+              </a:solidFill>
+              <a:latin typeface="Arial" panose="020B0604020202020204" pitchFamily="34" charset="0"/>
+              <a:cs typeface="Arial" panose="020B0604020202020204" pitchFamily="34" charset="0"/>
+            </a:rPr>
+            <a:t>Adatom catalysis</a:t>
+          </a:r>
+        </a:p>
+      </cdr:txBody>
+    </cdr:sp>
+  </cdr:relSizeAnchor>
+  <cdr:relSizeAnchor xmlns:cdr="http://schemas.openxmlformats.org/drawingml/2006/chartDrawing">
+    <cdr:from>
+      <cdr:x>0.37915</cdr:x>
+      <cdr:y>0.33511</cdr:y>
+    </cdr:from>
+    <cdr:to>
+      <cdr:x>0.86126</cdr:x>
+      <cdr:y>0.41004</cdr:y>
+    </cdr:to>
+    <cdr:sp macro="" textlink="">
+      <cdr:nvSpPr>
+        <cdr:cNvPr id="4" name="TextBox 1">
+          <a:extLst xmlns:a="http://schemas.openxmlformats.org/drawingml/2006/main">
+            <a:ext uri="{FF2B5EF4-FFF2-40B4-BE49-F238E27FC236}">
+              <a16:creationId xmlns:a16="http://schemas.microsoft.com/office/drawing/2014/main" id="{4DCDEDA7-A9FA-694F-9B62-47D17F137D3F}"/>
+            </a:ext>
+          </a:extLst>
+        </cdr:cNvPr>
+        <cdr:cNvSpPr txBox="1"/>
+      </cdr:nvSpPr>
+      <cdr:spPr>
+        <a:xfrm xmlns:a="http://schemas.openxmlformats.org/drawingml/2006/main" rot="20700000">
+          <a:off x="2842992" y="1599305"/>
+          <a:ext cx="3615093" cy="357598"/>
+        </a:xfrm>
+        <a:prstGeom xmlns:a="http://schemas.openxmlformats.org/drawingml/2006/main" prst="rect">
+          <a:avLst/>
+        </a:prstGeom>
+        <a:noFill xmlns:a="http://schemas.openxmlformats.org/drawingml/2006/main"/>
+      </cdr:spPr>
+      <cdr:txBody>
+        <a:bodyPr xmlns:a="http://schemas.openxmlformats.org/drawingml/2006/main" wrap="square" rtlCol="0" anchor="ctr" anchorCtr="1">
+          <a:spAutoFit/>
+        </a:bodyPr>
+        <a:lstStyle xmlns:a="http://schemas.openxmlformats.org/drawingml/2006/main">
+          <a:lvl1pPr marL="0" indent="0">
+            <a:defRPr sz="1100">
+              <a:latin typeface="+mn-lt"/>
+              <a:ea typeface="+mn-ea"/>
+              <a:cs typeface="+mn-cs"/>
+            </a:defRPr>
+          </a:lvl1pPr>
+          <a:lvl2pPr marL="457200" indent="0">
+            <a:defRPr sz="1100">
+              <a:latin typeface="+mn-lt"/>
+              <a:ea typeface="+mn-ea"/>
+              <a:cs typeface="+mn-cs"/>
+            </a:defRPr>
+          </a:lvl2pPr>
+          <a:lvl3pPr marL="914400" indent="0">
+            <a:defRPr sz="1100">
+              <a:latin typeface="+mn-lt"/>
+              <a:ea typeface="+mn-ea"/>
+              <a:cs typeface="+mn-cs"/>
+            </a:defRPr>
+          </a:lvl3pPr>
+          <a:lvl4pPr marL="1371600" indent="0">
+            <a:defRPr sz="1100">
+              <a:latin typeface="+mn-lt"/>
+              <a:ea typeface="+mn-ea"/>
+              <a:cs typeface="+mn-cs"/>
+            </a:defRPr>
+          </a:lvl4pPr>
+          <a:lvl5pPr marL="1828800" indent="0">
+            <a:defRPr sz="1100">
+              <a:latin typeface="+mn-lt"/>
+              <a:ea typeface="+mn-ea"/>
+              <a:cs typeface="+mn-cs"/>
+            </a:defRPr>
+          </a:lvl5pPr>
+          <a:lvl6pPr marL="2286000" indent="0">
+            <a:defRPr sz="1100">
+              <a:latin typeface="+mn-lt"/>
+              <a:ea typeface="+mn-ea"/>
+              <a:cs typeface="+mn-cs"/>
+            </a:defRPr>
+          </a:lvl6pPr>
+          <a:lvl7pPr marL="2743200" indent="0">
+            <a:defRPr sz="1100">
+              <a:latin typeface="+mn-lt"/>
+              <a:ea typeface="+mn-ea"/>
+              <a:cs typeface="+mn-cs"/>
+            </a:defRPr>
+          </a:lvl7pPr>
+          <a:lvl8pPr marL="3200400" indent="0">
+            <a:defRPr sz="1100">
+              <a:latin typeface="+mn-lt"/>
+              <a:ea typeface="+mn-ea"/>
+              <a:cs typeface="+mn-cs"/>
+            </a:defRPr>
+          </a:lvl8pPr>
+          <a:lvl9pPr marL="3657600" indent="0">
+            <a:defRPr sz="1100">
+              <a:latin typeface="+mn-lt"/>
+              <a:ea typeface="+mn-ea"/>
+              <a:cs typeface="+mn-cs"/>
+            </a:defRPr>
+          </a:lvl9pPr>
+        </a:lstStyle>
+        <a:p xmlns:a="http://schemas.openxmlformats.org/drawingml/2006/main">
+          <a:pPr algn="ctr"/>
+          <a:r>
+            <a:rPr lang="en-US" sz="1800" b="0" i="0">
+              <a:solidFill>
+                <a:srgbClr val="FF0000"/>
+              </a:solidFill>
+              <a:latin typeface="Arial" panose="020B0604020202020204" pitchFamily="34" charset="0"/>
+              <a:cs typeface="Arial" panose="020B0604020202020204" pitchFamily="34" charset="0"/>
+            </a:rPr>
+            <a:t>Line of thermoneutral extraction</a:t>
+          </a:r>
+        </a:p>
+      </cdr:txBody>
+    </cdr:sp>
+  </cdr:relSizeAnchor>
+  <cdr:relSizeAnchor xmlns:cdr="http://schemas.openxmlformats.org/drawingml/2006/chartDrawing">
+    <cdr:from>
+      <cdr:x>0.56937</cdr:x>
+      <cdr:y>0.5038</cdr:y>
+    </cdr:from>
+    <cdr:to>
+      <cdr:x>0.8973</cdr:x>
+      <cdr:y>0.63923</cdr:y>
+    </cdr:to>
+    <cdr:sp macro="" textlink="">
+      <cdr:nvSpPr>
+        <cdr:cNvPr id="5" name="TextBox 1">
+          <a:extLst xmlns:a="http://schemas.openxmlformats.org/drawingml/2006/main">
+            <a:ext uri="{FF2B5EF4-FFF2-40B4-BE49-F238E27FC236}">
+              <a16:creationId xmlns:a16="http://schemas.microsoft.com/office/drawing/2014/main" id="{E5BBF1A7-9F0E-E94F-B985-7436D94298F8}"/>
+            </a:ext>
+          </a:extLst>
+        </cdr:cNvPr>
+        <cdr:cNvSpPr txBox="1"/>
+      </cdr:nvSpPr>
+      <cdr:spPr>
+        <a:xfrm xmlns:a="http://schemas.openxmlformats.org/drawingml/2006/main">
+          <a:off x="4269366" y="2404367"/>
+          <a:ext cx="2458952" cy="646331"/>
+        </a:xfrm>
+        <a:prstGeom xmlns:a="http://schemas.openxmlformats.org/drawingml/2006/main" prst="rect">
+          <a:avLst/>
+        </a:prstGeom>
+      </cdr:spPr>
+      <cdr:txBody>
+        <a:bodyPr xmlns:a="http://schemas.openxmlformats.org/drawingml/2006/main" vertOverflow="clip" horzOverflow="clip" wrap="square" rtlCol="0" anchor="ctr" anchorCtr="1">
+          <a:spAutoFit/>
+        </a:bodyPr>
+        <a:lstStyle xmlns:a="http://schemas.openxmlformats.org/drawingml/2006/main">
+          <a:lvl1pPr marL="0" indent="0">
+            <a:defRPr sz="1100">
+              <a:latin typeface="+mn-lt"/>
+              <a:ea typeface="+mn-ea"/>
+              <a:cs typeface="+mn-cs"/>
+            </a:defRPr>
+          </a:lvl1pPr>
+          <a:lvl2pPr marL="457200" indent="0">
+            <a:defRPr sz="1100">
+              <a:latin typeface="+mn-lt"/>
+              <a:ea typeface="+mn-ea"/>
+              <a:cs typeface="+mn-cs"/>
+            </a:defRPr>
+          </a:lvl2pPr>
+          <a:lvl3pPr marL="914400" indent="0">
+            <a:defRPr sz="1100">
+              <a:latin typeface="+mn-lt"/>
+              <a:ea typeface="+mn-ea"/>
+              <a:cs typeface="+mn-cs"/>
+            </a:defRPr>
+          </a:lvl3pPr>
+          <a:lvl4pPr marL="1371600" indent="0">
+            <a:defRPr sz="1100">
+              <a:latin typeface="+mn-lt"/>
+              <a:ea typeface="+mn-ea"/>
+              <a:cs typeface="+mn-cs"/>
+            </a:defRPr>
+          </a:lvl4pPr>
+          <a:lvl5pPr marL="1828800" indent="0">
+            <a:defRPr sz="1100">
+              <a:latin typeface="+mn-lt"/>
+              <a:ea typeface="+mn-ea"/>
+              <a:cs typeface="+mn-cs"/>
+            </a:defRPr>
+          </a:lvl5pPr>
+          <a:lvl6pPr marL="2286000" indent="0">
+            <a:defRPr sz="1100">
+              <a:latin typeface="+mn-lt"/>
+              <a:ea typeface="+mn-ea"/>
+              <a:cs typeface="+mn-cs"/>
+            </a:defRPr>
+          </a:lvl6pPr>
+          <a:lvl7pPr marL="2743200" indent="0">
+            <a:defRPr sz="1100">
+              <a:latin typeface="+mn-lt"/>
+              <a:ea typeface="+mn-ea"/>
+              <a:cs typeface="+mn-cs"/>
+            </a:defRPr>
+          </a:lvl7pPr>
+          <a:lvl8pPr marL="3200400" indent="0">
+            <a:defRPr sz="1100">
+              <a:latin typeface="+mn-lt"/>
+              <a:ea typeface="+mn-ea"/>
+              <a:cs typeface="+mn-cs"/>
+            </a:defRPr>
+          </a:lvl8pPr>
+          <a:lvl9pPr marL="3657600" indent="0">
+            <a:defRPr sz="1100">
+              <a:latin typeface="+mn-lt"/>
+              <a:ea typeface="+mn-ea"/>
+              <a:cs typeface="+mn-cs"/>
+            </a:defRPr>
+          </a:lvl9pPr>
+        </a:lstStyle>
+        <a:p xmlns:a="http://schemas.openxmlformats.org/drawingml/2006/main">
+          <a:pPr algn="ctr"/>
+          <a:r>
+            <a:rPr lang="en-US" sz="1800" b="0" i="0" dirty="0">
+              <a:solidFill>
+                <a:srgbClr val="0070C0"/>
+              </a:solidFill>
+              <a:latin typeface="Arial" panose="020B0604020202020204" pitchFamily="34" charset="0"/>
+              <a:cs typeface="Arial" panose="020B0604020202020204" pitchFamily="34" charset="0"/>
+            </a:rPr>
+            <a:t>C-C bond formation on adatoms is slow</a:t>
+          </a:r>
+        </a:p>
+      </cdr:txBody>
+    </cdr:sp>
+  </cdr:relSizeAnchor>
+  <cdr:relSizeAnchor xmlns:cdr="http://schemas.openxmlformats.org/drawingml/2006/chartDrawing">
+    <cdr:from>
+      <cdr:x>0.14011</cdr:x>
+      <cdr:y>0.08534</cdr:y>
+    </cdr:from>
+    <cdr:to>
+      <cdr:x>0.57117</cdr:x>
+      <cdr:y>0.16027</cdr:y>
+    </cdr:to>
+    <cdr:sp macro="" textlink="">
+      <cdr:nvSpPr>
+        <cdr:cNvPr id="6" name="TextBox 1">
+          <a:extLst xmlns:a="http://schemas.openxmlformats.org/drawingml/2006/main">
+            <a:ext uri="{FF2B5EF4-FFF2-40B4-BE49-F238E27FC236}">
+              <a16:creationId xmlns:a16="http://schemas.microsoft.com/office/drawing/2014/main" id="{08A724B4-5BB2-4C44-8434-EFD425EA7E32}"/>
+            </a:ext>
+          </a:extLst>
+        </cdr:cNvPr>
+        <cdr:cNvSpPr txBox="1"/>
+      </cdr:nvSpPr>
+      <cdr:spPr>
+        <a:xfrm xmlns:a="http://schemas.openxmlformats.org/drawingml/2006/main">
+          <a:off x="1050586" y="407293"/>
+          <a:ext cx="3232286" cy="357598"/>
+        </a:xfrm>
+        <a:prstGeom xmlns:a="http://schemas.openxmlformats.org/drawingml/2006/main" prst="rect">
+          <a:avLst/>
+        </a:prstGeom>
+      </cdr:spPr>
+      <cdr:txBody>
+        <a:bodyPr xmlns:a="http://schemas.openxmlformats.org/drawingml/2006/main" wrap="square" rtlCol="0" anchor="ctr" anchorCtr="1">
+          <a:spAutoFit/>
+        </a:bodyPr>
+        <a:lstStyle xmlns:a="http://schemas.openxmlformats.org/drawingml/2006/main">
+          <a:lvl1pPr marL="0" indent="0">
+            <a:defRPr sz="1100">
+              <a:latin typeface="+mn-lt"/>
+              <a:ea typeface="+mn-ea"/>
+              <a:cs typeface="+mn-cs"/>
+            </a:defRPr>
+          </a:lvl1pPr>
+          <a:lvl2pPr marL="457200" indent="0">
+            <a:defRPr sz="1100">
+              <a:latin typeface="+mn-lt"/>
+              <a:ea typeface="+mn-ea"/>
+              <a:cs typeface="+mn-cs"/>
+            </a:defRPr>
+          </a:lvl2pPr>
+          <a:lvl3pPr marL="914400" indent="0">
+            <a:defRPr sz="1100">
+              <a:latin typeface="+mn-lt"/>
+              <a:ea typeface="+mn-ea"/>
+              <a:cs typeface="+mn-cs"/>
+            </a:defRPr>
+          </a:lvl3pPr>
+          <a:lvl4pPr marL="1371600" indent="0">
+            <a:defRPr sz="1100">
+              <a:latin typeface="+mn-lt"/>
+              <a:ea typeface="+mn-ea"/>
+              <a:cs typeface="+mn-cs"/>
+            </a:defRPr>
+          </a:lvl4pPr>
+          <a:lvl5pPr marL="1828800" indent="0">
+            <a:defRPr sz="1100">
+              <a:latin typeface="+mn-lt"/>
+              <a:ea typeface="+mn-ea"/>
+              <a:cs typeface="+mn-cs"/>
+            </a:defRPr>
+          </a:lvl5pPr>
+          <a:lvl6pPr marL="2286000" indent="0">
+            <a:defRPr sz="1100">
+              <a:latin typeface="+mn-lt"/>
+              <a:ea typeface="+mn-ea"/>
+              <a:cs typeface="+mn-cs"/>
+            </a:defRPr>
+          </a:lvl6pPr>
+          <a:lvl7pPr marL="2743200" indent="0">
+            <a:defRPr sz="1100">
+              <a:latin typeface="+mn-lt"/>
+              <a:ea typeface="+mn-ea"/>
+              <a:cs typeface="+mn-cs"/>
+            </a:defRPr>
+          </a:lvl7pPr>
+          <a:lvl8pPr marL="3200400" indent="0">
+            <a:defRPr sz="1100">
+              <a:latin typeface="+mn-lt"/>
+              <a:ea typeface="+mn-ea"/>
+              <a:cs typeface="+mn-cs"/>
+            </a:defRPr>
+          </a:lvl8pPr>
+          <a:lvl9pPr marL="3657600" indent="0">
+            <a:defRPr sz="1100">
+              <a:latin typeface="+mn-lt"/>
+              <a:ea typeface="+mn-ea"/>
+              <a:cs typeface="+mn-cs"/>
+            </a:defRPr>
+          </a:lvl9pPr>
+        </a:lstStyle>
+        <a:p xmlns:a="http://schemas.openxmlformats.org/drawingml/2006/main">
+          <a:pPr algn="ctr"/>
+          <a:r>
+            <a:rPr lang="en-US" sz="1800" b="0" i="0">
+              <a:solidFill>
+                <a:schemeClr val="accent2"/>
+              </a:solidFill>
+              <a:latin typeface="Arial" panose="020B0604020202020204" pitchFamily="34" charset="0"/>
+              <a:cs typeface="Arial" panose="020B0604020202020204" pitchFamily="34" charset="0"/>
+            </a:rPr>
+            <a:t>Adatom extraction is difficult</a:t>
+          </a:r>
+        </a:p>
+      </cdr:txBody>
+    </cdr:sp>
+  </cdr:relSizeAnchor>
+</c:userShapes>
+</file>
+
 <file path=ppt/slideLayouts/slideLayout1.xml><?xml version="1.0" encoding="utf-8"?>
 <p:sldLayout xmlns:a="http://schemas.openxmlformats.org/drawingml/2006/main" xmlns:r="http://schemas.openxmlformats.org/officeDocument/2006/relationships" xmlns:p="http://schemas.openxmlformats.org/presentationml/2006/main" type="title" preserve="1">
   <p:cSld name="Title Slide">
@@ -1231,7 +2905,7 @@
           <a:p>
             <a:fld id="{81DD9E49-0831-7F4A-BD39-8B4C948BC6B9}" type="datetimeFigureOut">
               <a:rPr lang="en-US" smtClean="0"/>
-              <a:t>8/7/21</a:t>
+              <a:t>8/8/21</a:t>
             </a:fld>
             <a:endParaRPr lang="en-US"/>
           </a:p>
@@ -1429,7 +3103,7 @@
           <a:p>
             <a:fld id="{81DD9E49-0831-7F4A-BD39-8B4C948BC6B9}" type="datetimeFigureOut">
               <a:rPr lang="en-US" smtClean="0"/>
-              <a:t>8/7/21</a:t>
+              <a:t>8/8/21</a:t>
             </a:fld>
             <a:endParaRPr lang="en-US"/>
           </a:p>
@@ -1637,7 +3311,7 @@
           <a:p>
             <a:fld id="{81DD9E49-0831-7F4A-BD39-8B4C948BC6B9}" type="datetimeFigureOut">
               <a:rPr lang="en-US" smtClean="0"/>
-              <a:t>8/7/21</a:t>
+              <a:t>8/8/21</a:t>
             </a:fld>
             <a:endParaRPr lang="en-US"/>
           </a:p>
@@ -1835,7 +3509,7 @@
           <a:p>
             <a:fld id="{81DD9E49-0831-7F4A-BD39-8B4C948BC6B9}" type="datetimeFigureOut">
               <a:rPr lang="en-US" smtClean="0"/>
-              <a:t>8/7/21</a:t>
+              <a:t>8/8/21</a:t>
             </a:fld>
             <a:endParaRPr lang="en-US"/>
           </a:p>
@@ -2110,7 +3784,7 @@
           <a:p>
             <a:fld id="{81DD9E49-0831-7F4A-BD39-8B4C948BC6B9}" type="datetimeFigureOut">
               <a:rPr lang="en-US" smtClean="0"/>
-              <a:t>8/7/21</a:t>
+              <a:t>8/8/21</a:t>
             </a:fld>
             <a:endParaRPr lang="en-US"/>
           </a:p>
@@ -2375,7 +4049,7 @@
           <a:p>
             <a:fld id="{81DD9E49-0831-7F4A-BD39-8B4C948BC6B9}" type="datetimeFigureOut">
               <a:rPr lang="en-US" smtClean="0"/>
-              <a:t>8/7/21</a:t>
+              <a:t>8/8/21</a:t>
             </a:fld>
             <a:endParaRPr lang="en-US"/>
           </a:p>
@@ -2787,7 +4461,7 @@
           <a:p>
             <a:fld id="{81DD9E49-0831-7F4A-BD39-8B4C948BC6B9}" type="datetimeFigureOut">
               <a:rPr lang="en-US" smtClean="0"/>
-              <a:t>8/7/21</a:t>
+              <a:t>8/8/21</a:t>
             </a:fld>
             <a:endParaRPr lang="en-US"/>
           </a:p>
@@ -2928,7 +4602,7 @@
           <a:p>
             <a:fld id="{81DD9E49-0831-7F4A-BD39-8B4C948BC6B9}" type="datetimeFigureOut">
               <a:rPr lang="en-US" smtClean="0"/>
-              <a:t>8/7/21</a:t>
+              <a:t>8/8/21</a:t>
             </a:fld>
             <a:endParaRPr lang="en-US"/>
           </a:p>
@@ -3041,7 +4715,7 @@
           <a:p>
             <a:fld id="{81DD9E49-0831-7F4A-BD39-8B4C948BC6B9}" type="datetimeFigureOut">
               <a:rPr lang="en-US" smtClean="0"/>
-              <a:t>8/7/21</a:t>
+              <a:t>8/8/21</a:t>
             </a:fld>
             <a:endParaRPr lang="en-US"/>
           </a:p>
@@ -3352,7 +5026,7 @@
           <a:p>
             <a:fld id="{81DD9E49-0831-7F4A-BD39-8B4C948BC6B9}" type="datetimeFigureOut">
               <a:rPr lang="en-US" smtClean="0"/>
-              <a:t>8/7/21</a:t>
+              <a:t>8/8/21</a:t>
             </a:fld>
             <a:endParaRPr lang="en-US"/>
           </a:p>
@@ -3640,7 +5314,7 @@
           <a:p>
             <a:fld id="{81DD9E49-0831-7F4A-BD39-8B4C948BC6B9}" type="datetimeFigureOut">
               <a:rPr lang="en-US" smtClean="0"/>
-              <a:t>8/7/21</a:t>
+              <a:t>8/8/21</a:t>
             </a:fld>
             <a:endParaRPr lang="en-US"/>
           </a:p>
@@ -3881,7 +5555,7 @@
           <a:p>
             <a:fld id="{81DD9E49-0831-7F4A-BD39-8B4C948BC6B9}" type="datetimeFigureOut">
               <a:rPr lang="en-US" smtClean="0"/>
-              <a:t>8/7/21</a:t>
+              <a:t>8/8/21</a:t>
             </a:fld>
             <a:endParaRPr lang="en-US"/>
           </a:p>
@@ -4419,6 +6093,66 @@
 </p:sld>
 </file>
 
+<file path=ppt/slides/slide2.xml><?xml version="1.0" encoding="utf-8"?>
+<p:sld xmlns:a="http://schemas.openxmlformats.org/drawingml/2006/main" xmlns:r="http://schemas.openxmlformats.org/officeDocument/2006/relationships" xmlns:p="http://schemas.openxmlformats.org/presentationml/2006/main">
+  <p:cSld>
+    <p:spTree>
+      <p:nvGrpSpPr>
+        <p:cNvPr id="1" name=""/>
+        <p:cNvGrpSpPr/>
+        <p:nvPr/>
+      </p:nvGrpSpPr>
+      <p:grpSpPr>
+        <a:xfrm>
+          <a:off x="0" y="0"/>
+          <a:ext cx="0" cy="0"/>
+          <a:chOff x="0" y="0"/>
+          <a:chExt cx="0" cy="0"/>
+        </a:xfrm>
+      </p:grpSpPr>
+      <p:graphicFrame>
+        <p:nvGraphicFramePr>
+          <p:cNvPr id="2" name="Chart 1">
+            <a:extLst>
+              <a:ext uri="{FF2B5EF4-FFF2-40B4-BE49-F238E27FC236}">
+                <a16:creationId xmlns:a16="http://schemas.microsoft.com/office/drawing/2014/main" id="{04C3BC52-CA7D-1F4B-A356-B99EA0DF1554}"/>
+              </a:ext>
+            </a:extLst>
+          </p:cNvPr>
+          <p:cNvGraphicFramePr>
+            <a:graphicFrameLocks/>
+          </p:cNvGraphicFramePr>
+          <p:nvPr>
+            <p:extLst>
+              <p:ext uri="{D42A27DB-BD31-4B8C-83A1-F6EECF244321}">
+                <p14:modId xmlns:p14="http://schemas.microsoft.com/office/powerpoint/2010/main" val="1874833254"/>
+              </p:ext>
+            </p:extLst>
+          </p:nvPr>
+        </p:nvGraphicFramePr>
+        <p:xfrm>
+          <a:off x="2346798" y="1042770"/>
+          <a:ext cx="7498404" cy="4772460"/>
+        </p:xfrm>
+        <a:graphic>
+          <a:graphicData uri="http://schemas.openxmlformats.org/drawingml/2006/chart">
+            <c:chart xmlns:c="http://schemas.openxmlformats.org/drawingml/2006/chart" xmlns:r="http://schemas.openxmlformats.org/officeDocument/2006/relationships" r:id="rId2"/>
+          </a:graphicData>
+        </a:graphic>
+      </p:graphicFrame>
+    </p:spTree>
+    <p:extLst>
+      <p:ext uri="{BB962C8B-B14F-4D97-AF65-F5344CB8AC3E}">
+        <p14:creationId xmlns:p14="http://schemas.microsoft.com/office/powerpoint/2010/main" val="921952475"/>
+      </p:ext>
+    </p:extLst>
+  </p:cSld>
+  <p:clrMapOvr>
+    <a:masterClrMapping/>
+  </p:clrMapOvr>
+</p:sld>
+</file>
+
 <file path=ppt/theme/theme1.xml><?xml version="1.0" encoding="utf-8"?>
 <a:theme xmlns:a="http://schemas.openxmlformats.org/drawingml/2006/main" name="Office Theme">
   <a:themeElements>

</xml_diff>

<commit_message>
conclusion.pdf - axis units updated
</commit_message>
<xml_diff>
--- a/correlation-to-add.pptx
+++ b/correlation-to-add.pptx
@@ -591,7 +591,7 @@
           </c:spPr>
           <c:marker>
             <c:symbol val="circle"/>
-            <c:size val="10"/>
+            <c:size val="13"/>
             <c:spPr>
               <a:solidFill>
                 <a:schemeClr val="accent5"/>
@@ -612,7 +612,7 @@
                   <a:bodyPr/>
                   <a:lstStyle/>
                   <a:p>
-                    <a:fld id="{83BEC6C7-44A9-BF4A-8C88-4D2E5A5138A3}" type="CELLRANGE">
+                    <a:fld id="{9CEF5B84-D489-E843-9F09-833F1694B7EC}" type="CELLRANGE">
                       <a:rPr lang="en-US"/>
                       <a:pPr/>
                       <a:t>[CELLRANGE]</a:t>
@@ -646,7 +646,7 @@
                   <a:bodyPr/>
                   <a:lstStyle/>
                   <a:p>
-                    <a:fld id="{69B9F4D7-47A4-BE4D-91BB-CEB72941E110}" type="CELLRANGE">
+                    <a:fld id="{B9FFF204-C17C-854D-A10E-7FD8F1B58886}" type="CELLRANGE">
                       <a:rPr lang="en-US"/>
                       <a:pPr/>
                       <a:t>[CELLRANGE]</a:t>
@@ -680,7 +680,7 @@
                   <a:bodyPr/>
                   <a:lstStyle/>
                   <a:p>
-                    <a:fld id="{36CCA582-951D-EA4C-9426-38EADFD38B5E}" type="CELLRANGE">
+                    <a:fld id="{1B9A19F7-44F8-C741-BCEA-0D57735A48A8}" type="CELLRANGE">
                       <a:rPr lang="en-US"/>
                       <a:pPr/>
                       <a:t>[CELLRANGE]</a:t>
@@ -837,7 +837,7 @@
           </c:spPr>
           <c:marker>
             <c:symbol val="circle"/>
-            <c:size val="10"/>
+            <c:size val="13"/>
             <c:spPr>
               <a:solidFill>
                 <a:srgbClr val="FF0000"/>
@@ -1160,8 +1160,20 @@
                   </a:defRPr>
                 </a:pPr>
                 <a:r>
-                  <a:rPr lang="en-US"/>
-                  <a:t>Δ: phenyl-metal binding enegy, eV</a:t>
+                  <a:rPr lang="en-US" dirty="0" err="1"/>
+                  <a:t>Δ</a:t>
+                </a:r>
+                <a:r>
+                  <a:rPr lang="en-US" dirty="0"/>
+                  <a:t>: phenyl-metal binding energy</a:t>
+                </a:r>
+                <a:r>
+                  <a:rPr lang="en-US" baseline="0" dirty="0"/>
+                  <a:t> (</a:t>
+                </a:r>
+                <a:r>
+                  <a:rPr lang="en-US" dirty="0"/>
+                  <a:t>eV)</a:t>
                 </a:r>
               </a:p>
             </c:rich>
@@ -1265,8 +1277,8 @@
                   </a:defRPr>
                 </a:pPr>
                 <a:r>
-                  <a:rPr lang="en-US"/>
-                  <a:t>Energy of unassisted extraction, eV</a:t>
+                  <a:rPr lang="en-US" dirty="0"/>
+                  <a:t>Energy of unassisted extraction (eV)</a:t>
                 </a:r>
               </a:p>
             </c:rich>
@@ -3093,7 +3105,7 @@
           <a:p>
             <a:fld id="{81DD9E49-0831-7F4A-BD39-8B4C948BC6B9}" type="datetimeFigureOut">
               <a:rPr lang="en-US" smtClean="0"/>
-              <a:t>8/16/21</a:t>
+              <a:t>8/24/21</a:t>
             </a:fld>
             <a:endParaRPr lang="en-US"/>
           </a:p>
@@ -3291,7 +3303,7 @@
           <a:p>
             <a:fld id="{81DD9E49-0831-7F4A-BD39-8B4C948BC6B9}" type="datetimeFigureOut">
               <a:rPr lang="en-US" smtClean="0"/>
-              <a:t>8/16/21</a:t>
+              <a:t>8/24/21</a:t>
             </a:fld>
             <a:endParaRPr lang="en-US"/>
           </a:p>
@@ -3499,7 +3511,7 @@
           <a:p>
             <a:fld id="{81DD9E49-0831-7F4A-BD39-8B4C948BC6B9}" type="datetimeFigureOut">
               <a:rPr lang="en-US" smtClean="0"/>
-              <a:t>8/16/21</a:t>
+              <a:t>8/24/21</a:t>
             </a:fld>
             <a:endParaRPr lang="en-US"/>
           </a:p>
@@ -3697,7 +3709,7 @@
           <a:p>
             <a:fld id="{81DD9E49-0831-7F4A-BD39-8B4C948BC6B9}" type="datetimeFigureOut">
               <a:rPr lang="en-US" smtClean="0"/>
-              <a:t>8/16/21</a:t>
+              <a:t>8/24/21</a:t>
             </a:fld>
             <a:endParaRPr lang="en-US"/>
           </a:p>
@@ -3972,7 +3984,7 @@
           <a:p>
             <a:fld id="{81DD9E49-0831-7F4A-BD39-8B4C948BC6B9}" type="datetimeFigureOut">
               <a:rPr lang="en-US" smtClean="0"/>
-              <a:t>8/16/21</a:t>
+              <a:t>8/24/21</a:t>
             </a:fld>
             <a:endParaRPr lang="en-US"/>
           </a:p>
@@ -4237,7 +4249,7 @@
           <a:p>
             <a:fld id="{81DD9E49-0831-7F4A-BD39-8B4C948BC6B9}" type="datetimeFigureOut">
               <a:rPr lang="en-US" smtClean="0"/>
-              <a:t>8/16/21</a:t>
+              <a:t>8/24/21</a:t>
             </a:fld>
             <a:endParaRPr lang="en-US"/>
           </a:p>
@@ -4649,7 +4661,7 @@
           <a:p>
             <a:fld id="{81DD9E49-0831-7F4A-BD39-8B4C948BC6B9}" type="datetimeFigureOut">
               <a:rPr lang="en-US" smtClean="0"/>
-              <a:t>8/16/21</a:t>
+              <a:t>8/24/21</a:t>
             </a:fld>
             <a:endParaRPr lang="en-US"/>
           </a:p>
@@ -4790,7 +4802,7 @@
           <a:p>
             <a:fld id="{81DD9E49-0831-7F4A-BD39-8B4C948BC6B9}" type="datetimeFigureOut">
               <a:rPr lang="en-US" smtClean="0"/>
-              <a:t>8/16/21</a:t>
+              <a:t>8/24/21</a:t>
             </a:fld>
             <a:endParaRPr lang="en-US"/>
           </a:p>
@@ -4903,7 +4915,7 @@
           <a:p>
             <a:fld id="{81DD9E49-0831-7F4A-BD39-8B4C948BC6B9}" type="datetimeFigureOut">
               <a:rPr lang="en-US" smtClean="0"/>
-              <a:t>8/16/21</a:t>
+              <a:t>8/24/21</a:t>
             </a:fld>
             <a:endParaRPr lang="en-US"/>
           </a:p>
@@ -5214,7 +5226,7 @@
           <a:p>
             <a:fld id="{81DD9E49-0831-7F4A-BD39-8B4C948BC6B9}" type="datetimeFigureOut">
               <a:rPr lang="en-US" smtClean="0"/>
-              <a:t>8/16/21</a:t>
+              <a:t>8/24/21</a:t>
             </a:fld>
             <a:endParaRPr lang="en-US"/>
           </a:p>
@@ -5502,7 +5514,7 @@
           <a:p>
             <a:fld id="{81DD9E49-0831-7F4A-BD39-8B4C948BC6B9}" type="datetimeFigureOut">
               <a:rPr lang="en-US" smtClean="0"/>
-              <a:t>8/16/21</a:t>
+              <a:t>8/24/21</a:t>
             </a:fld>
             <a:endParaRPr lang="en-US"/>
           </a:p>
@@ -5743,7 +5755,7 @@
           <a:p>
             <a:fld id="{81DD9E49-0831-7F4A-BD39-8B4C948BC6B9}" type="datetimeFigureOut">
               <a:rPr lang="en-US" smtClean="0"/>
-              <a:t>8/16/21</a:t>
+              <a:t>8/24/21</a:t>
             </a:fld>
             <a:endParaRPr lang="en-US"/>
           </a:p>
@@ -6313,14 +6325,14 @@
           <p:nvPr>
             <p:extLst>
               <p:ext uri="{D42A27DB-BD31-4B8C-83A1-F6EECF244321}">
-                <p14:modId xmlns:p14="http://schemas.microsoft.com/office/powerpoint/2010/main" val="4025881107"/>
+                <p14:modId xmlns:p14="http://schemas.microsoft.com/office/powerpoint/2010/main" val="3219789171"/>
               </p:ext>
             </p:extLst>
           </p:nvPr>
         </p:nvGraphicFramePr>
         <p:xfrm>
-          <a:off x="2318876" y="863510"/>
-          <a:ext cx="7554248" cy="5130980"/>
+          <a:off x="2318876" y="727113"/>
+          <a:ext cx="7554248" cy="5267377"/>
         </p:xfrm>
         <a:graphic>
           <a:graphicData uri="http://schemas.openxmlformats.org/drawingml/2006/chart">

</xml_diff>